<commit_message>
Codecademy generated from the project submission page.
</commit_message>
<xml_diff>
--- a/Intro to Data analysis/CG Codecademy Data Analysis.pptx
+++ b/Intro to Data analysis/CG Codecademy Data Analysis.pptx
@@ -7,8 +7,10 @@
   <p:sldIdLst>
     <p:sldId id="256" r:id="rId2"/>
     <p:sldId id="257" r:id="rId3"/>
-    <p:sldId id="259" r:id="rId4"/>
-    <p:sldId id="260" r:id="rId5"/>
+    <p:sldId id="261" r:id="rId4"/>
+    <p:sldId id="259" r:id="rId5"/>
+    <p:sldId id="262" r:id="rId6"/>
+    <p:sldId id="260" r:id="rId7"/>
   </p:sldIdLst>
   <p:sldSz cx="9144000" cy="6858000" type="screen4x3"/>
   <p:notesSz cx="6858000" cy="9144000"/>
@@ -578,7 +580,7 @@
           <a:p>
             <a:fld id="{65BC3483-EDCB-4915-BF37-4420F4A7D7DD}" type="datetimeFigureOut">
               <a:rPr lang="en-GB" smtClean="0"/>
-              <a:t>19/07/2018</a:t>
+              <a:t>27/07/2018</a:t>
             </a:fld>
             <a:endParaRPr lang="en-GB"/>
           </a:p>
@@ -743,7 +745,7 @@
           <a:p>
             <a:fld id="{65BC3483-EDCB-4915-BF37-4420F4A7D7DD}" type="datetimeFigureOut">
               <a:rPr lang="en-GB" smtClean="0"/>
-              <a:t>19/07/2018</a:t>
+              <a:t>27/07/2018</a:t>
             </a:fld>
             <a:endParaRPr lang="en-GB"/>
           </a:p>
@@ -918,7 +920,7 @@
           <a:p>
             <a:fld id="{65BC3483-EDCB-4915-BF37-4420F4A7D7DD}" type="datetimeFigureOut">
               <a:rPr lang="en-GB" smtClean="0"/>
-              <a:t>19/07/2018</a:t>
+              <a:t>27/07/2018</a:t>
             </a:fld>
             <a:endParaRPr lang="en-GB"/>
           </a:p>
@@ -1083,7 +1085,7 @@
           <a:p>
             <a:fld id="{65BC3483-EDCB-4915-BF37-4420F4A7D7DD}" type="datetimeFigureOut">
               <a:rPr lang="en-GB" smtClean="0"/>
-              <a:t>19/07/2018</a:t>
+              <a:t>27/07/2018</a:t>
             </a:fld>
             <a:endParaRPr lang="en-GB"/>
           </a:p>
@@ -1636,7 +1638,7 @@
           <a:p>
             <a:fld id="{65BC3483-EDCB-4915-BF37-4420F4A7D7DD}" type="datetimeFigureOut">
               <a:rPr lang="en-GB" smtClean="0"/>
-              <a:t>19/07/2018</a:t>
+              <a:t>27/07/2018</a:t>
             </a:fld>
             <a:endParaRPr lang="en-GB"/>
           </a:p>
@@ -1896,7 +1898,7 @@
           <a:p>
             <a:fld id="{65BC3483-EDCB-4915-BF37-4420F4A7D7DD}" type="datetimeFigureOut">
               <a:rPr lang="en-GB" smtClean="0"/>
-              <a:t>19/07/2018</a:t>
+              <a:t>27/07/2018</a:t>
             </a:fld>
             <a:endParaRPr lang="en-GB"/>
           </a:p>
@@ -2384,7 +2386,7 @@
           <a:p>
             <a:fld id="{65BC3483-EDCB-4915-BF37-4420F4A7D7DD}" type="datetimeFigureOut">
               <a:rPr lang="en-GB" smtClean="0"/>
-              <a:t>19/07/2018</a:t>
+              <a:t>27/07/2018</a:t>
             </a:fld>
             <a:endParaRPr lang="en-GB"/>
           </a:p>
@@ -2497,7 +2499,7 @@
           <a:p>
             <a:fld id="{65BC3483-EDCB-4915-BF37-4420F4A7D7DD}" type="datetimeFigureOut">
               <a:rPr lang="en-GB" smtClean="0"/>
-              <a:t>19/07/2018</a:t>
+              <a:t>27/07/2018</a:t>
             </a:fld>
             <a:endParaRPr lang="en-GB"/>
           </a:p>
@@ -2587,7 +2589,7 @@
           <a:p>
             <a:fld id="{65BC3483-EDCB-4915-BF37-4420F4A7D7DD}" type="datetimeFigureOut">
               <a:rPr lang="en-GB" smtClean="0"/>
-              <a:t>19/07/2018</a:t>
+              <a:t>27/07/2018</a:t>
             </a:fld>
             <a:endParaRPr lang="en-GB"/>
           </a:p>
@@ -3017,7 +3019,7 @@
           <a:p>
             <a:fld id="{65BC3483-EDCB-4915-BF37-4420F4A7D7DD}" type="datetimeFigureOut">
               <a:rPr lang="en-GB" smtClean="0"/>
-              <a:t>19/07/2018</a:t>
+              <a:t>27/07/2018</a:t>
             </a:fld>
             <a:endParaRPr lang="en-GB"/>
           </a:p>
@@ -3550,7 +3552,7 @@
           <a:p>
             <a:fld id="{65BC3483-EDCB-4915-BF37-4420F4A7D7DD}" type="datetimeFigureOut">
               <a:rPr lang="en-GB" smtClean="0"/>
-              <a:t>19/07/2018</a:t>
+              <a:t>27/07/2018</a:t>
             </a:fld>
             <a:endParaRPr lang="en-GB"/>
           </a:p>
@@ -4390,7 +4392,7 @@
           <a:p>
             <a:fld id="{65BC3483-EDCB-4915-BF37-4420F4A7D7DD}" type="datetimeFigureOut">
               <a:rPr lang="en-GB" smtClean="0"/>
-              <a:t>19/07/2018</a:t>
+              <a:t>27/07/2018</a:t>
             </a:fld>
             <a:endParaRPr lang="en-GB"/>
           </a:p>
@@ -4907,23 +4909,47 @@
         </p:nvSpPr>
         <p:spPr>
           <a:xfrm>
-            <a:off x="822960" y="1100629"/>
-            <a:ext cx="7520940" cy="1248252"/>
+            <a:off x="899592" y="1052736"/>
+            <a:ext cx="7416824" cy="864096"/>
           </a:xfrm>
         </p:spPr>
         <p:txBody>
-          <a:bodyPr/>
+          <a:bodyPr>
+            <a:normAutofit/>
+          </a:bodyPr>
           <a:lstStyle/>
           <a:p>
             <a:r>
               <a:rPr lang="en-GB" b="0" dirty="0" smtClean="0"/>
-              <a:t>Species.csv is a csv file which contains a table of data which has a 5,543 records of different species and details the category, scientific name ,common names and conservation status. 	</a:t>
-            </a:r>
-          </a:p>
-          <a:p>
+              <a:t>Species.csv is a csv file which contains a table of data which has </a:t>
+            </a:r>
             <a:r>
               <a:rPr lang="en-GB" b="0" dirty="0" smtClean="0"/>
-              <a:t>From the data we learned that the vast majority of species had ‘no intervention’  </a:t>
+              <a:t>records </a:t>
+            </a:r>
+            <a:r>
+              <a:rPr lang="en-GB" b="0" dirty="0" smtClean="0"/>
+              <a:t>of different species and details the category, scientific </a:t>
+            </a:r>
+            <a:r>
+              <a:rPr lang="en-GB" b="0" dirty="0" smtClean="0"/>
+              <a:t>name, common </a:t>
+            </a:r>
+            <a:r>
+              <a:rPr lang="en-GB" b="0" dirty="0" smtClean="0"/>
+              <a:t>names and conservation </a:t>
+            </a:r>
+            <a:r>
+              <a:rPr lang="en-GB" b="0" dirty="0" smtClean="0"/>
+              <a:t>status</a:t>
+            </a:r>
+            <a:r>
+              <a:rPr lang="en-GB" b="0" dirty="0"/>
+              <a:t> </a:t>
+            </a:r>
+            <a:r>
+              <a:rPr lang="en-GB" b="0" dirty="0" smtClean="0"/>
+              <a:t>of each. </a:t>
             </a:r>
             <a:endParaRPr lang="en-GB" b="0" dirty="0"/>
           </a:p>
@@ -4931,112 +4957,158 @@
       </p:sp>
       <p:sp>
         <p:nvSpPr>
-          <p:cNvPr id="4" name="TextBox 3"/>
-          <p:cNvSpPr txBox="1"/>
+          <p:cNvPr id="6" name="Rectangle 5"/>
+          <p:cNvSpPr/>
           <p:nvPr/>
         </p:nvSpPr>
         <p:spPr>
           <a:xfrm>
-            <a:off x="755576" y="2934628"/>
-            <a:ext cx="2520280" cy="1354217"/>
+            <a:off x="899592" y="1943587"/>
+            <a:ext cx="4572000" cy="1323439"/>
           </a:xfrm>
           <a:prstGeom prst="rect">
             <a:avLst/>
           </a:prstGeom>
-          <a:noFill/>
         </p:spPr>
         <p:txBody>
-          <a:bodyPr wrap="square" rtlCol="0">
+          <a:bodyPr>
             <a:spAutoFit/>
           </a:bodyPr>
           <a:lstStyle/>
           <a:p>
             <a:r>
+              <a:rPr lang="en-GB" sz="1600" dirty="0"/>
+              <a:t>Amongst other things we discovered</a:t>
+            </a:r>
+            <a:r>
               <a:rPr lang="en-GB" sz="1600" dirty="0" smtClean="0"/>
-              <a:t>No intervention: 5,363</a:t>
-            </a:r>
-          </a:p>
-          <a:p>
+              <a:t>:</a:t>
+            </a:r>
+          </a:p>
+          <a:p>
+            <a:r>
+              <a:rPr lang="en-GB" sz="1600" dirty="0"/>
+              <a:t>	</a:t>
+            </a:r>
+          </a:p>
+          <a:p>
+            <a:pPr marL="285750" indent="-285750">
+              <a:buFont typeface="Arial" panose="020B0604020202020204" pitchFamily="34" charset="0"/>
+              <a:buChar char="•"/>
+            </a:pPr>
             <a:r>
               <a:rPr lang="en-GB" sz="1600" dirty="0" smtClean="0"/>
-              <a:t>Species of concern: 151</a:t>
-            </a:r>
-          </a:p>
-          <a:p>
-            <a:r>
-              <a:rPr lang="en-GB" sz="1600" dirty="0" smtClean="0"/>
-              <a:t>Endangered : 15</a:t>
-            </a:r>
-          </a:p>
-          <a:p>
-            <a:r>
-              <a:rPr lang="en-GB" sz="1600" dirty="0" smtClean="0"/>
-              <a:t>Threatened: 10</a:t>
-            </a:r>
-          </a:p>
-          <a:p>
-            <a:r>
-              <a:rPr lang="en-GB" sz="1600" dirty="0" smtClean="0"/>
-              <a:t>In recovery: 4</a:t>
-            </a:r>
-            <a:endParaRPr lang="en-GB" sz="1600" dirty="0"/>
-          </a:p>
-        </p:txBody>
-      </p:sp>
-      <p:pic>
-        <p:nvPicPr>
-          <p:cNvPr id="3074" name="Picture 2"/>
-          <p:cNvPicPr>
-            <a:picLocks noChangeAspect="1" noChangeArrowheads="1"/>
-          </p:cNvPicPr>
+              <a:t>The </a:t>
+            </a:r>
+            <a:r>
+              <a:rPr lang="en-GB" sz="1600" dirty="0"/>
+              <a:t>scientific name of each species</a:t>
+            </a:r>
+          </a:p>
+          <a:p>
+            <a:pPr marL="285750" indent="-285750">
+              <a:buFont typeface="Arial" panose="020B0604020202020204" pitchFamily="34" charset="0"/>
+              <a:buChar char="•"/>
+            </a:pPr>
+            <a:r>
+              <a:rPr lang="en-GB" sz="1600" dirty="0"/>
+              <a:t>The common names of each species</a:t>
+            </a:r>
+          </a:p>
+          <a:p>
+            <a:pPr marL="285750" indent="-285750">
+              <a:buFont typeface="Arial" panose="020B0604020202020204" pitchFamily="34" charset="0"/>
+              <a:buChar char="•"/>
+            </a:pPr>
+            <a:r>
+              <a:rPr lang="en-GB" sz="1600" dirty="0"/>
+              <a:t>The species conservation status </a:t>
+            </a:r>
+          </a:p>
+        </p:txBody>
+      </p:sp>
+      <p:sp>
+        <p:nvSpPr>
+          <p:cNvPr id="12" name="Rectangle 11"/>
+          <p:cNvSpPr/>
           <p:nvPr/>
-        </p:nvPicPr>
-        <p:blipFill>
-          <a:blip r:embed="rId2">
-            <a:extLst>
-              <a:ext uri="{28A0092B-C50C-407E-A947-70E740481C1C}">
-                <a14:useLocalDpi xmlns:a14="http://schemas.microsoft.com/office/drawing/2010/main" val="0"/>
-              </a:ext>
-            </a:extLst>
-          </a:blip>
-          <a:srcRect/>
-          <a:stretch>
-            <a:fillRect/>
-          </a:stretch>
-        </p:blipFill>
-        <p:spPr bwMode="auto">
+        </p:nvSpPr>
+        <p:spPr>
           <a:xfrm>
-            <a:off x="2987824" y="2395017"/>
-            <a:ext cx="5977522" cy="2433438"/>
+            <a:off x="899592" y="3291021"/>
+            <a:ext cx="7048804" cy="830997"/>
           </a:xfrm>
           <a:prstGeom prst="rect">
             <a:avLst/>
           </a:prstGeom>
-          <a:noFill/>
-          <a:ln>
-            <a:noFill/>
-          </a:ln>
-          <a:extLst>
-            <a:ext uri="{909E8E84-426E-40DD-AFC4-6F175D3DCCD1}">
-              <a14:hiddenFill xmlns:a14="http://schemas.microsoft.com/office/drawing/2010/main">
-                <a:solidFill>
-                  <a:schemeClr val="accent1"/>
-                </a:solidFill>
-              </a14:hiddenFill>
-            </a:ext>
-            <a:ext uri="{91240B29-F687-4F45-9708-019B960494DF}">
-              <a14:hiddenLine xmlns:a14="http://schemas.microsoft.com/office/drawing/2010/main" w="9525">
-                <a:solidFill>
-                  <a:schemeClr val="tx1"/>
-                </a:solidFill>
-                <a:miter lim="800000"/>
-                <a:headEnd/>
-                <a:tailEnd/>
-              </a14:hiddenLine>
-            </a:ext>
-          </a:extLst>
         </p:spPr>
-      </p:pic>
+        <p:txBody>
+          <a:bodyPr wrap="square">
+            <a:spAutoFit/>
+          </a:bodyPr>
+          <a:lstStyle/>
+          <a:p>
+            <a:r>
+              <a:rPr lang="en-GB" sz="1600" dirty="0" smtClean="0"/>
+              <a:t>We learnt from the data that there were 5,541 unique species recorded and that there were 6 unique categories of species: Mammal, Bird, Reptile, Amphibian</a:t>
+            </a:r>
+            <a:r>
+              <a:rPr lang="en-GB" sz="1600" dirty="0"/>
+              <a:t>,</a:t>
+            </a:r>
+            <a:r>
+              <a:rPr lang="en-GB" sz="1600" dirty="0" smtClean="0"/>
+              <a:t> Fish and Vascular Plant.</a:t>
+            </a:r>
+            <a:endParaRPr lang="en-GB" sz="1600" dirty="0"/>
+          </a:p>
+        </p:txBody>
+      </p:sp>
+      <p:sp>
+        <p:nvSpPr>
+          <p:cNvPr id="14" name="Rectangle 13"/>
+          <p:cNvSpPr/>
+          <p:nvPr/>
+        </p:nvSpPr>
+        <p:spPr>
+          <a:xfrm>
+            <a:off x="899592" y="4125665"/>
+            <a:ext cx="7048804" cy="830997"/>
+          </a:xfrm>
+          <a:prstGeom prst="rect">
+            <a:avLst/>
+          </a:prstGeom>
+        </p:spPr>
+        <p:txBody>
+          <a:bodyPr wrap="square">
+            <a:spAutoFit/>
+          </a:bodyPr>
+          <a:lstStyle/>
+          <a:p>
+            <a:r>
+              <a:rPr lang="en-GB" sz="1600" dirty="0" smtClean="0"/>
+              <a:t>Each of these records fell into a different category of conservation status which helps to determine the endangerment of the species. These </a:t>
+            </a:r>
+            <a:r>
+              <a:rPr lang="en-GB" sz="1600" dirty="0"/>
+              <a:t>categories </a:t>
+            </a:r>
+            <a:r>
+              <a:rPr lang="en-GB" sz="1600" dirty="0" smtClean="0"/>
+              <a:t>were ‘No intervention’, ‘Species </a:t>
+            </a:r>
+            <a:r>
+              <a:rPr lang="en-GB" sz="1600" dirty="0"/>
+              <a:t>of </a:t>
+            </a:r>
+            <a:r>
+              <a:rPr lang="en-GB" sz="1600" dirty="0" smtClean="0"/>
+              <a:t>concern’, ‘Endangered’, ‘Threatened’ and ‘In recovery’. </a:t>
+            </a:r>
+            <a:endParaRPr lang="en-GB" sz="1600" dirty="0"/>
+          </a:p>
+        </p:txBody>
+      </p:sp>
     </p:spTree>
     <p:extLst>
       <p:ext uri="{BB962C8B-B14F-4D97-AF65-F5344CB8AC3E}">
@@ -5090,12 +5162,8 @@
           <a:lstStyle/>
           <a:p>
             <a:r>
-              <a:rPr lang="en-GB" dirty="0"/>
-              <a:t>S</a:t>
-            </a:r>
-            <a:r>
-              <a:rPr lang="en-GB" dirty="0" smtClean="0"/>
-              <a:t>ignificance</a:t>
+              <a:rPr lang="en-GB" b="1" dirty="0" smtClean="0"/>
+              <a:t>species_info.csv</a:t>
             </a:r>
             <a:endParaRPr lang="en-GB" dirty="0"/>
           </a:p>
@@ -5103,31 +5171,39 @@
       </p:sp>
       <p:sp>
         <p:nvSpPr>
-          <p:cNvPr id="5" name="TextBox 4"/>
-          <p:cNvSpPr txBox="1"/>
-          <p:nvPr/>
+          <p:cNvPr id="3" name="Content Placeholder 2"/>
+          <p:cNvSpPr>
+            <a:spLocks noGrp="1"/>
+          </p:cNvSpPr>
+          <p:nvPr>
+            <p:ph idx="1"/>
+          </p:nvPr>
         </p:nvSpPr>
         <p:spPr>
           <a:xfrm>
-            <a:off x="594445" y="980728"/>
-            <a:ext cx="7704856" cy="584775"/>
+            <a:off x="899592" y="1052736"/>
+            <a:ext cx="7520940" cy="1248252"/>
           </a:xfrm>
-          <a:prstGeom prst="rect">
-            <a:avLst/>
-          </a:prstGeom>
-          <a:noFill/>
         </p:spPr>
         <p:txBody>
-          <a:bodyPr wrap="square" rtlCol="0">
-            <a:spAutoFit/>
+          <a:bodyPr>
+            <a:normAutofit/>
           </a:bodyPr>
           <a:lstStyle/>
           <a:p>
             <a:r>
-              <a:rPr lang="en-GB" sz="1600" dirty="0" smtClean="0"/>
-              <a:t>It seems that some categories of species are more likely that other to require intervention. Mammals most of all.</a:t>
-            </a:r>
-            <a:endParaRPr lang="en-GB" sz="1600" dirty="0"/>
+              <a:rPr lang="en-GB" b="0" dirty="0" smtClean="0"/>
+              <a:t>From </a:t>
+            </a:r>
+            <a:r>
+              <a:rPr lang="en-GB" b="0" dirty="0" smtClean="0"/>
+              <a:t>the data we learned that the vast majority of species had ‘no </a:t>
+            </a:r>
+            <a:r>
+              <a:rPr lang="en-GB" b="0" dirty="0" smtClean="0"/>
+              <a:t>intervention’ listed as the conservation status.</a:t>
+            </a:r>
+            <a:endParaRPr lang="en-GB" b="0" dirty="0"/>
           </a:p>
         </p:txBody>
       </p:sp>
@@ -5135,11 +5211,9 @@
         <p:nvPicPr>
           <p:cNvPr id="1026" name="Picture 2"/>
           <p:cNvPicPr>
-            <a:picLocks noGrp="1" noChangeAspect="1" noChangeArrowheads="1"/>
+            <a:picLocks noChangeAspect="1" noChangeArrowheads="1"/>
           </p:cNvPicPr>
-          <p:nvPr>
-            <p:ph idx="1"/>
-          </p:nvPr>
+          <p:nvPr/>
         </p:nvPicPr>
         <p:blipFill>
           <a:blip r:embed="rId2">
@@ -5156,8 +5230,232 @@
         </p:blipFill>
         <p:spPr bwMode="auto">
           <a:xfrm>
-            <a:off x="1619672" y="1645561"/>
-            <a:ext cx="4896544" cy="1783439"/>
+            <a:off x="395536" y="1556791"/>
+            <a:ext cx="3819051" cy="3461712"/>
+          </a:xfrm>
+          <a:prstGeom prst="rect">
+            <a:avLst/>
+          </a:prstGeom>
+          <a:noFill/>
+          <a:ln>
+            <a:noFill/>
+          </a:ln>
+          <a:extLst>
+            <a:ext uri="{909E8E84-426E-40DD-AFC4-6F175D3DCCD1}">
+              <a14:hiddenFill xmlns:a14="http://schemas.microsoft.com/office/drawing/2010/main">
+                <a:solidFill>
+                  <a:schemeClr val="accent1"/>
+                </a:solidFill>
+              </a14:hiddenFill>
+            </a:ext>
+            <a:ext uri="{91240B29-F687-4F45-9708-019B960494DF}">
+              <a14:hiddenLine xmlns:a14="http://schemas.microsoft.com/office/drawing/2010/main" w="9525">
+                <a:solidFill>
+                  <a:schemeClr val="tx1"/>
+                </a:solidFill>
+                <a:miter lim="800000"/>
+                <a:headEnd/>
+                <a:tailEnd/>
+              </a14:hiddenLine>
+            </a:ext>
+          </a:extLst>
+        </p:spPr>
+      </p:pic>
+      <p:pic>
+        <p:nvPicPr>
+          <p:cNvPr id="1028" name="Picture 4"/>
+          <p:cNvPicPr>
+            <a:picLocks noChangeAspect="1" noChangeArrowheads="1"/>
+          </p:cNvPicPr>
+          <p:nvPr/>
+        </p:nvPicPr>
+        <p:blipFill>
+          <a:blip r:embed="rId3" cstate="print">
+            <a:extLst>
+              <a:ext uri="{28A0092B-C50C-407E-A947-70E740481C1C}">
+                <a14:useLocalDpi xmlns:a14="http://schemas.microsoft.com/office/drawing/2010/main" val="0"/>
+              </a:ext>
+            </a:extLst>
+          </a:blip>
+          <a:srcRect/>
+          <a:stretch>
+            <a:fillRect/>
+          </a:stretch>
+        </p:blipFill>
+        <p:spPr bwMode="auto">
+          <a:xfrm>
+            <a:off x="4572000" y="2094498"/>
+            <a:ext cx="3818871" cy="2386299"/>
+          </a:xfrm>
+          <a:prstGeom prst="rect">
+            <a:avLst/>
+          </a:prstGeom>
+          <a:noFill/>
+          <a:ln>
+            <a:noFill/>
+          </a:ln>
+          <a:extLst>
+            <a:ext uri="{909E8E84-426E-40DD-AFC4-6F175D3DCCD1}">
+              <a14:hiddenFill xmlns:a14="http://schemas.microsoft.com/office/drawing/2010/main">
+                <a:solidFill>
+                  <a:schemeClr val="accent1"/>
+                </a:solidFill>
+              </a14:hiddenFill>
+            </a:ext>
+            <a:ext uri="{91240B29-F687-4F45-9708-019B960494DF}">
+              <a14:hiddenLine xmlns:a14="http://schemas.microsoft.com/office/drawing/2010/main" w="9525">
+                <a:solidFill>
+                  <a:schemeClr val="tx1"/>
+                </a:solidFill>
+                <a:miter lim="800000"/>
+                <a:headEnd/>
+                <a:tailEnd/>
+              </a14:hiddenLine>
+            </a:ext>
+          </a:extLst>
+        </p:spPr>
+      </p:pic>
+    </p:spTree>
+    <p:extLst>
+      <p:ext uri="{BB962C8B-B14F-4D97-AF65-F5344CB8AC3E}">
+        <p14:creationId xmlns:p14="http://schemas.microsoft.com/office/powerpoint/2010/main" val="3805307208"/>
+      </p:ext>
+    </p:extLst>
+  </p:cSld>
+  <p:clrMapOvr>
+    <a:masterClrMapping/>
+  </p:clrMapOvr>
+  <p:timing>
+    <p:tnLst>
+      <p:par>
+        <p:cTn id="1" dur="indefinite" restart="never" nodeType="tmRoot"/>
+      </p:par>
+    </p:tnLst>
+  </p:timing>
+</p:sld>
+</file>
+
+<file path=ppt/slides/slide4.xml><?xml version="1.0" encoding="utf-8"?>
+<p:sld xmlns:a="http://schemas.openxmlformats.org/drawingml/2006/main" xmlns:r="http://schemas.openxmlformats.org/officeDocument/2006/relationships" xmlns:p="http://schemas.openxmlformats.org/presentationml/2006/main">
+  <p:cSld>
+    <p:spTree>
+      <p:nvGrpSpPr>
+        <p:cNvPr id="1" name=""/>
+        <p:cNvGrpSpPr/>
+        <p:nvPr/>
+      </p:nvGrpSpPr>
+      <p:grpSpPr>
+        <a:xfrm>
+          <a:off x="0" y="0"/>
+          <a:ext cx="0" cy="0"/>
+          <a:chOff x="0" y="0"/>
+          <a:chExt cx="0" cy="0"/>
+        </a:xfrm>
+      </p:grpSpPr>
+      <p:sp>
+        <p:nvSpPr>
+          <p:cNvPr id="2" name="Title 1"/>
+          <p:cNvSpPr>
+            <a:spLocks noGrp="1"/>
+          </p:cNvSpPr>
+          <p:nvPr>
+            <p:ph type="title"/>
+          </p:nvPr>
+        </p:nvSpPr>
+        <p:spPr/>
+        <p:txBody>
+          <a:bodyPr/>
+          <a:lstStyle/>
+          <a:p>
+            <a:r>
+              <a:rPr lang="en-GB" dirty="0"/>
+              <a:t>S</a:t>
+            </a:r>
+            <a:r>
+              <a:rPr lang="en-GB" dirty="0" smtClean="0"/>
+              <a:t>ignificance</a:t>
+            </a:r>
+            <a:endParaRPr lang="en-GB" dirty="0"/>
+          </a:p>
+        </p:txBody>
+      </p:sp>
+      <p:sp>
+        <p:nvSpPr>
+          <p:cNvPr id="5" name="TextBox 4"/>
+          <p:cNvSpPr txBox="1"/>
+          <p:nvPr/>
+        </p:nvSpPr>
+        <p:spPr>
+          <a:xfrm>
+            <a:off x="594445" y="980728"/>
+            <a:ext cx="7704856" cy="584775"/>
+          </a:xfrm>
+          <a:prstGeom prst="rect">
+            <a:avLst/>
+          </a:prstGeom>
+          <a:noFill/>
+        </p:spPr>
+        <p:txBody>
+          <a:bodyPr wrap="square" rtlCol="0">
+            <a:spAutoFit/>
+          </a:bodyPr>
+          <a:lstStyle/>
+          <a:p>
+            <a:r>
+              <a:rPr lang="en-GB" sz="1600" dirty="0" smtClean="0"/>
+              <a:t>At face value it was suggested </a:t>
+            </a:r>
+            <a:r>
+              <a:rPr lang="en-GB" sz="1600" dirty="0" smtClean="0"/>
+              <a:t>that </a:t>
+            </a:r>
+            <a:r>
+              <a:rPr lang="en-GB" sz="1600" dirty="0" smtClean="0"/>
+              <a:t>some categories of species are more likely </a:t>
+            </a:r>
+            <a:r>
+              <a:rPr lang="en-GB" sz="1600" dirty="0" smtClean="0"/>
+              <a:t>than others </a:t>
+            </a:r>
+            <a:r>
+              <a:rPr lang="en-GB" sz="1600" dirty="0" smtClean="0"/>
+              <a:t>to require intervention</a:t>
+            </a:r>
+            <a:r>
+              <a:rPr lang="en-GB" sz="1600" dirty="0" smtClean="0"/>
+              <a:t>.</a:t>
+            </a:r>
+            <a:endParaRPr lang="en-GB" sz="1600" dirty="0"/>
+          </a:p>
+        </p:txBody>
+      </p:sp>
+      <p:pic>
+        <p:nvPicPr>
+          <p:cNvPr id="1026" name="Picture 2"/>
+          <p:cNvPicPr>
+            <a:picLocks noGrp="1" noChangeAspect="1" noChangeArrowheads="1"/>
+          </p:cNvPicPr>
+          <p:nvPr>
+            <p:ph idx="1"/>
+          </p:nvPr>
+        </p:nvPicPr>
+        <p:blipFill>
+          <a:blip r:embed="rId2">
+            <a:extLst>
+              <a:ext uri="{28A0092B-C50C-407E-A947-70E740481C1C}">
+                <a14:useLocalDpi xmlns:a14="http://schemas.microsoft.com/office/drawing/2010/main" val="0"/>
+              </a:ext>
+            </a:extLst>
+          </a:blip>
+          <a:srcRect/>
+          <a:stretch>
+            <a:fillRect/>
+          </a:stretch>
+        </p:blipFill>
+        <p:spPr bwMode="auto">
+          <a:xfrm>
+            <a:off x="755576" y="1700808"/>
+            <a:ext cx="6984776" cy="2544024"/>
           </a:xfrm>
           <a:prstGeom prst="rect">
             <a:avLst/>
@@ -5199,14 +5497,14 @@
       </p:pic>
       <p:sp>
         <p:nvSpPr>
-          <p:cNvPr id="9" name="TextBox 8"/>
+          <p:cNvPr id="7" name="TextBox 6"/>
           <p:cNvSpPr txBox="1"/>
           <p:nvPr/>
         </p:nvSpPr>
         <p:spPr>
           <a:xfrm>
-            <a:off x="594445" y="3429000"/>
-            <a:ext cx="7704856" cy="1631216"/>
+            <a:off x="746845" y="4365104"/>
+            <a:ext cx="7704856" cy="338554"/>
           </a:xfrm>
           <a:prstGeom prst="rect">
             <a:avLst/>
@@ -5221,41 +5519,7 @@
           <a:p>
             <a:r>
               <a:rPr lang="en-GB" sz="1600" dirty="0" smtClean="0"/>
-              <a:t>Running </a:t>
-            </a:r>
-            <a:r>
-              <a:rPr lang="en-GB" sz="1600" dirty="0"/>
-              <a:t>a Chi-Squared Test for </a:t>
-            </a:r>
-            <a:r>
-              <a:rPr lang="en-GB" sz="1600" dirty="0" smtClean="0"/>
-              <a:t>Significance we found that there was no significant difference between the likelihood </a:t>
-            </a:r>
-            <a:r>
-              <a:rPr lang="en-GB" sz="1600" dirty="0" smtClean="0"/>
-              <a:t>mammals </a:t>
-            </a:r>
-            <a:r>
-              <a:rPr lang="en-GB" sz="1600" dirty="0" smtClean="0"/>
-              <a:t>being endangered over birds ( p-value of 0.68) however, there was a significantly greater </a:t>
-            </a:r>
-            <a:r>
-              <a:rPr lang="en-GB" sz="1600" dirty="0" smtClean="0"/>
-              <a:t>likelihood </a:t>
-            </a:r>
-            <a:r>
-              <a:rPr lang="en-GB" sz="1600" dirty="0" smtClean="0"/>
-              <a:t>that Mammals would be endangered over reptiles ( p-value of 0.04</a:t>
-            </a:r>
-            <a:r>
-              <a:rPr lang="en-GB" sz="1600" dirty="0" smtClean="0"/>
-              <a:t>).</a:t>
-            </a:r>
-          </a:p>
-          <a:p>
-            <a:r>
-              <a:rPr lang="en-GB" sz="1600" dirty="0" smtClean="0"/>
-              <a:t>Therefore we can conclude that some categories of animals are more likely to be endangered than others.</a:t>
+              <a:t>However, further analysis was require to reach a conclusion</a:t>
             </a:r>
             <a:endParaRPr lang="en-GB" sz="1600" dirty="0"/>
           </a:p>
@@ -5281,7 +5545,7 @@
 </p:sld>
 </file>
 
-<file path=ppt/slides/slide4.xml><?xml version="1.0" encoding="utf-8"?>
+<file path=ppt/slides/slide5.xml><?xml version="1.0" encoding="utf-8"?>
 <p:sld xmlns:a="http://schemas.openxmlformats.org/drawingml/2006/main" xmlns:r="http://schemas.openxmlformats.org/officeDocument/2006/relationships" xmlns:p="http://schemas.openxmlformats.org/presentationml/2006/main">
   <p:cSld>
     <p:spTree>
@@ -5310,11 +5574,394 @@
         </p:nvSpPr>
         <p:spPr/>
         <p:txBody>
+          <a:bodyPr/>
+          <a:lstStyle/>
+          <a:p>
+            <a:r>
+              <a:rPr lang="en-GB" dirty="0" smtClean="0"/>
+              <a:t>Recommendation</a:t>
+            </a:r>
+            <a:endParaRPr lang="en-GB" dirty="0"/>
+          </a:p>
+        </p:txBody>
+      </p:sp>
+      <p:sp>
+        <p:nvSpPr>
+          <p:cNvPr id="3" name="Content Placeholder 2"/>
+          <p:cNvSpPr>
+            <a:spLocks noGrp="1"/>
+          </p:cNvSpPr>
+          <p:nvPr>
+            <p:ph idx="1"/>
+          </p:nvPr>
+        </p:nvSpPr>
+        <p:spPr>
+          <a:xfrm>
+            <a:off x="1071350" y="980728"/>
+            <a:ext cx="7236000" cy="1164708"/>
+          </a:xfrm>
+        </p:spPr>
+        <p:txBody>
           <a:bodyPr>
             <a:normAutofit/>
           </a:bodyPr>
           <a:lstStyle/>
           <a:p>
+            <a:pPr marL="0">
+              <a:spcBef>
+                <a:spcPts val="0"/>
+              </a:spcBef>
+            </a:pPr>
+            <a:r>
+              <a:rPr lang="en-GB" b="0" dirty="0" smtClean="0"/>
+              <a:t>Having looked deeper into the data our recommendation to scientists concerned about endangered species would be that we should focus more on some categories of species than others. We reached this conclusion through a Chi-squared test for significance.</a:t>
+            </a:r>
+            <a:endParaRPr lang="en-GB" b="0" dirty="0"/>
+          </a:p>
+        </p:txBody>
+      </p:sp>
+      <p:sp>
+        <p:nvSpPr>
+          <p:cNvPr id="4" name="TextBox 3"/>
+          <p:cNvSpPr txBox="1"/>
+          <p:nvPr/>
+        </p:nvSpPr>
+        <p:spPr>
+          <a:xfrm>
+            <a:off x="1098087" y="2852936"/>
+            <a:ext cx="7236000" cy="1077218"/>
+          </a:xfrm>
+          <a:prstGeom prst="rect">
+            <a:avLst/>
+          </a:prstGeom>
+          <a:noFill/>
+        </p:spPr>
+        <p:txBody>
+          <a:bodyPr wrap="square" rtlCol="0">
+            <a:spAutoFit/>
+          </a:bodyPr>
+          <a:lstStyle/>
+          <a:p>
+            <a:r>
+              <a:rPr lang="en-GB" sz="1600" dirty="0" smtClean="0"/>
+              <a:t>When running the test we found </a:t>
+            </a:r>
+            <a:r>
+              <a:rPr lang="en-GB" sz="1600" dirty="0" smtClean="0"/>
+              <a:t>that there was no significant difference between the likelihood mammals being endangered over birds </a:t>
+            </a:r>
+            <a:r>
+              <a:rPr lang="en-GB" sz="1600" dirty="0" smtClean="0"/>
+              <a:t>(p-value </a:t>
+            </a:r>
+            <a:r>
+              <a:rPr lang="en-GB" sz="1600" dirty="0" smtClean="0"/>
+              <a:t>of </a:t>
+            </a:r>
+            <a:r>
+              <a:rPr lang="en-GB" sz="1600" dirty="0" smtClean="0"/>
+              <a:t>0.68), however, there </a:t>
+            </a:r>
+            <a:r>
+              <a:rPr lang="en-GB" sz="1600" dirty="0" smtClean="0"/>
+              <a:t>was a significantly greater likelihood that Mammals would be endangered over reptiles </a:t>
+            </a:r>
+            <a:r>
+              <a:rPr lang="en-GB" sz="1600" dirty="0" smtClean="0"/>
+              <a:t>(p-value </a:t>
+            </a:r>
+            <a:r>
+              <a:rPr lang="en-GB" sz="1600" dirty="0" smtClean="0"/>
+              <a:t>of 0.04</a:t>
+            </a:r>
+            <a:r>
+              <a:rPr lang="en-GB" sz="1600" dirty="0" smtClean="0"/>
+              <a:t>). </a:t>
+            </a:r>
+            <a:endParaRPr lang="en-GB" sz="1600" dirty="0"/>
+          </a:p>
+        </p:txBody>
+      </p:sp>
+      <p:sp>
+        <p:nvSpPr>
+          <p:cNvPr id="5" name="TextBox 4"/>
+          <p:cNvSpPr txBox="1"/>
+          <p:nvPr/>
+        </p:nvSpPr>
+        <p:spPr>
+          <a:xfrm>
+            <a:off x="1071350" y="4149080"/>
+            <a:ext cx="7236000" cy="584775"/>
+          </a:xfrm>
+          <a:prstGeom prst="rect">
+            <a:avLst/>
+          </a:prstGeom>
+          <a:noFill/>
+        </p:spPr>
+        <p:txBody>
+          <a:bodyPr wrap="square" rtlCol="0">
+            <a:spAutoFit/>
+          </a:bodyPr>
+          <a:lstStyle/>
+          <a:p>
+            <a:r>
+              <a:rPr lang="en-GB" sz="1600" dirty="0"/>
+              <a:t>As such we can conclude that some categories of animals are more likely to be endangered than others.</a:t>
+            </a:r>
+            <a:endParaRPr lang="en-GB" sz="1600" dirty="0"/>
+          </a:p>
+        </p:txBody>
+      </p:sp>
+      <p:sp>
+        <p:nvSpPr>
+          <p:cNvPr id="6" name="Content Placeholder 2"/>
+          <p:cNvSpPr txBox="1">
+            <a:spLocks/>
+          </p:cNvSpPr>
+          <p:nvPr/>
+        </p:nvSpPr>
+        <p:spPr>
+          <a:xfrm>
+            <a:off x="1071350" y="2132856"/>
+            <a:ext cx="7236000" cy="1164708"/>
+          </a:xfrm>
+          <a:prstGeom prst="rect">
+            <a:avLst/>
+          </a:prstGeom>
+        </p:spPr>
+        <p:txBody>
+          <a:bodyPr vert="horz" lIns="91440" tIns="45720" rIns="91440" bIns="45720" rtlCol="0">
+            <a:normAutofit/>
+          </a:bodyPr>
+          <a:lstStyle>
+            <a:lvl1pPr marL="342900" indent="-342900" algn="l" defTabSz="914400" rtl="0" eaLnBrk="1" latinLnBrk="0" hangingPunct="1">
+              <a:spcBef>
+                <a:spcPts val="800"/>
+              </a:spcBef>
+              <a:buFont typeface="Arial" pitchFamily="34" charset="0"/>
+              <a:buNone/>
+              <a:defRPr sz="1600" b="1" kern="1200">
+                <a:solidFill>
+                  <a:schemeClr val="tx1"/>
+                </a:solidFill>
+                <a:latin typeface="+mn-lt"/>
+                <a:ea typeface="+mn-ea"/>
+                <a:cs typeface="+mn-cs"/>
+              </a:defRPr>
+            </a:lvl1pPr>
+            <a:lvl2pPr marL="173736" indent="-173736" algn="l" defTabSz="914400" rtl="0" eaLnBrk="1" latinLnBrk="0" hangingPunct="1">
+              <a:spcBef>
+                <a:spcPts val="300"/>
+              </a:spcBef>
+              <a:buClr>
+                <a:schemeClr val="accent2"/>
+              </a:buClr>
+              <a:buFont typeface="Wingdings" pitchFamily="2" charset="2"/>
+              <a:buChar char="§"/>
+              <a:defRPr sz="1600" kern="1200">
+                <a:solidFill>
+                  <a:schemeClr val="tx1"/>
+                </a:solidFill>
+                <a:latin typeface="+mn-lt"/>
+                <a:ea typeface="+mn-ea"/>
+                <a:cs typeface="+mn-cs"/>
+              </a:defRPr>
+            </a:lvl2pPr>
+            <a:lvl3pPr marL="402336" indent="-164592" algn="l" defTabSz="914400" rtl="0" eaLnBrk="1" latinLnBrk="0" hangingPunct="1">
+              <a:spcBef>
+                <a:spcPts val="300"/>
+              </a:spcBef>
+              <a:buClr>
+                <a:schemeClr val="accent2"/>
+              </a:buClr>
+              <a:buFont typeface="Wingdings" pitchFamily="2" charset="2"/>
+              <a:buChar char="§"/>
+              <a:defRPr sz="1600" kern="1200">
+                <a:solidFill>
+                  <a:schemeClr val="tx1"/>
+                </a:solidFill>
+                <a:latin typeface="+mn-lt"/>
+                <a:ea typeface="+mn-ea"/>
+                <a:cs typeface="+mn-cs"/>
+              </a:defRPr>
+            </a:lvl3pPr>
+            <a:lvl4pPr marL="630936" indent="-164592" algn="l" defTabSz="914400" rtl="0" eaLnBrk="1" latinLnBrk="0" hangingPunct="1">
+              <a:spcBef>
+                <a:spcPts val="300"/>
+              </a:spcBef>
+              <a:buClr>
+                <a:schemeClr val="accent2"/>
+              </a:buClr>
+              <a:buFont typeface="Wingdings" pitchFamily="2" charset="2"/>
+              <a:buChar char="§"/>
+              <a:defRPr sz="1600" kern="1200">
+                <a:solidFill>
+                  <a:schemeClr val="tx1"/>
+                </a:solidFill>
+                <a:latin typeface="+mn-lt"/>
+                <a:ea typeface="+mn-ea"/>
+                <a:cs typeface="+mn-cs"/>
+              </a:defRPr>
+            </a:lvl4pPr>
+            <a:lvl5pPr marL="859536" indent="-173736" algn="l" defTabSz="914400" rtl="0" eaLnBrk="1" latinLnBrk="0" hangingPunct="1">
+              <a:spcBef>
+                <a:spcPts val="300"/>
+              </a:spcBef>
+              <a:buClr>
+                <a:schemeClr val="accent2"/>
+              </a:buClr>
+              <a:buFont typeface="Wingdings" pitchFamily="2" charset="2"/>
+              <a:buChar char="§"/>
+              <a:defRPr sz="1600" kern="1200">
+                <a:solidFill>
+                  <a:schemeClr val="tx1"/>
+                </a:solidFill>
+                <a:latin typeface="+mn-lt"/>
+                <a:ea typeface="+mn-ea"/>
+                <a:cs typeface="+mn-cs"/>
+              </a:defRPr>
+            </a:lvl5pPr>
+            <a:lvl6pPr marL="1097280" indent="-173736" algn="l" defTabSz="914400" rtl="0" eaLnBrk="1" latinLnBrk="0" hangingPunct="1">
+              <a:spcBef>
+                <a:spcPts val="300"/>
+              </a:spcBef>
+              <a:buClr>
+                <a:schemeClr val="accent2"/>
+              </a:buClr>
+              <a:buFont typeface="Wingdings" pitchFamily="2" charset="2"/>
+              <a:buChar char="§"/>
+              <a:defRPr sz="1400" kern="1200">
+                <a:solidFill>
+                  <a:schemeClr val="tx1"/>
+                </a:solidFill>
+                <a:latin typeface="+mn-lt"/>
+                <a:ea typeface="+mn-ea"/>
+                <a:cs typeface="+mn-cs"/>
+              </a:defRPr>
+            </a:lvl6pPr>
+            <a:lvl7pPr marL="1353312" indent="-164592" algn="l" defTabSz="914400" rtl="0" eaLnBrk="1" latinLnBrk="0" hangingPunct="1">
+              <a:spcBef>
+                <a:spcPts val="300"/>
+              </a:spcBef>
+              <a:buClr>
+                <a:schemeClr val="accent2"/>
+              </a:buClr>
+              <a:buFont typeface="Wingdings" pitchFamily="2" charset="2"/>
+              <a:buChar char="§"/>
+              <a:defRPr sz="1400" kern="1200">
+                <a:solidFill>
+                  <a:schemeClr val="tx1"/>
+                </a:solidFill>
+                <a:latin typeface="+mn-lt"/>
+                <a:ea typeface="+mn-ea"/>
+                <a:cs typeface="+mn-cs"/>
+              </a:defRPr>
+            </a:lvl7pPr>
+            <a:lvl8pPr marL="1581912" indent="-164592" algn="l" defTabSz="914400" rtl="0" eaLnBrk="1" latinLnBrk="0" hangingPunct="1">
+              <a:spcBef>
+                <a:spcPts val="300"/>
+              </a:spcBef>
+              <a:buClr>
+                <a:schemeClr val="accent2"/>
+              </a:buClr>
+              <a:buFont typeface="Wingdings" pitchFamily="2" charset="2"/>
+              <a:buChar char="§"/>
+              <a:defRPr sz="1400" kern="1200">
+                <a:solidFill>
+                  <a:schemeClr val="tx1"/>
+                </a:solidFill>
+                <a:latin typeface="+mn-lt"/>
+                <a:ea typeface="+mn-ea"/>
+                <a:cs typeface="+mn-cs"/>
+              </a:defRPr>
+            </a:lvl8pPr>
+            <a:lvl9pPr marL="1792224" indent="-164592" algn="l" defTabSz="914400" rtl="0" eaLnBrk="1" latinLnBrk="0" hangingPunct="1">
+              <a:spcBef>
+                <a:spcPts val="300"/>
+              </a:spcBef>
+              <a:buClr>
+                <a:schemeClr val="accent2"/>
+              </a:buClr>
+              <a:buFont typeface="Wingdings" pitchFamily="2" charset="2"/>
+              <a:buChar char="§"/>
+              <a:defRPr sz="1400" kern="1200">
+                <a:solidFill>
+                  <a:schemeClr val="tx1"/>
+                </a:solidFill>
+                <a:latin typeface="+mn-lt"/>
+                <a:ea typeface="+mn-ea"/>
+                <a:cs typeface="+mn-cs"/>
+              </a:defRPr>
+            </a:lvl9pPr>
+          </a:lstStyle>
+          <a:p>
+            <a:pPr marL="0">
+              <a:spcBef>
+                <a:spcPts val="0"/>
+              </a:spcBef>
+            </a:pPr>
+            <a:r>
+              <a:rPr lang="en-GB" b="0" dirty="0" smtClean="0"/>
+              <a:t>Chi squared was the most reliable test to use as we have more than one categorical dataset</a:t>
+            </a:r>
+            <a:endParaRPr lang="en-GB" b="0" dirty="0"/>
+          </a:p>
+        </p:txBody>
+      </p:sp>
+    </p:spTree>
+    <p:extLst>
+      <p:ext uri="{BB962C8B-B14F-4D97-AF65-F5344CB8AC3E}">
+        <p14:creationId xmlns:p14="http://schemas.microsoft.com/office/powerpoint/2010/main" val="2040729397"/>
+      </p:ext>
+    </p:extLst>
+  </p:cSld>
+  <p:clrMapOvr>
+    <a:masterClrMapping/>
+  </p:clrMapOvr>
+  <p:timing>
+    <p:tnLst>
+      <p:par>
+        <p:cTn id="1" dur="indefinite" restart="never" nodeType="tmRoot"/>
+      </p:par>
+    </p:tnLst>
+  </p:timing>
+</p:sld>
+</file>
+
+<file path=ppt/slides/slide6.xml><?xml version="1.0" encoding="utf-8"?>
+<p:sld xmlns:a="http://schemas.openxmlformats.org/drawingml/2006/main" xmlns:r="http://schemas.openxmlformats.org/officeDocument/2006/relationships" xmlns:p="http://schemas.openxmlformats.org/presentationml/2006/main">
+  <p:cSld>
+    <p:spTree>
+      <p:nvGrpSpPr>
+        <p:cNvPr id="1" name=""/>
+        <p:cNvGrpSpPr/>
+        <p:nvPr/>
+      </p:nvGrpSpPr>
+      <p:grpSpPr>
+        <a:xfrm>
+          <a:off x="0" y="0"/>
+          <a:ext cx="0" cy="0"/>
+          <a:chOff x="0" y="0"/>
+          <a:chExt cx="0" cy="0"/>
+        </a:xfrm>
+      </p:grpSpPr>
+      <p:sp>
+        <p:nvSpPr>
+          <p:cNvPr id="2" name="Title 1"/>
+          <p:cNvSpPr>
+            <a:spLocks noGrp="1"/>
+          </p:cNvSpPr>
+          <p:nvPr>
+            <p:ph type="title"/>
+          </p:nvPr>
+        </p:nvSpPr>
+        <p:spPr/>
+        <p:txBody>
+          <a:bodyPr>
+            <a:normAutofit/>
+          </a:bodyPr>
+          <a:lstStyle/>
+          <a:p>
             <a:r>
               <a:rPr lang="en-GB" dirty="0"/>
               <a:t>sample size </a:t>
@@ -5327,9 +5974,92 @@
           </a:p>
         </p:txBody>
       </p:sp>
+      <p:sp>
+        <p:nvSpPr>
+          <p:cNvPr id="3" name="TextBox 2"/>
+          <p:cNvSpPr txBox="1"/>
+          <p:nvPr/>
+        </p:nvSpPr>
+        <p:spPr>
+          <a:xfrm>
+            <a:off x="1028133" y="908720"/>
+            <a:ext cx="6840760" cy="1077218"/>
+          </a:xfrm>
+          <a:prstGeom prst="rect">
+            <a:avLst/>
+          </a:prstGeom>
+          <a:noFill/>
+        </p:spPr>
+        <p:txBody>
+          <a:bodyPr wrap="square" rtlCol="0">
+            <a:spAutoFit/>
+          </a:bodyPr>
+          <a:lstStyle/>
+          <a:p>
+            <a:r>
+              <a:rPr lang="en-GB" sz="1600" dirty="0" smtClean="0"/>
+              <a:t>With a baseline 15</a:t>
+            </a:r>
+            <a:r>
+              <a:rPr lang="en-GB" sz="1600" dirty="0"/>
+              <a:t>% occurrence of foot and mouth disease in sheep at Bryce National Park, </a:t>
+            </a:r>
+            <a:r>
+              <a:rPr lang="en-GB" sz="1600" dirty="0" smtClean="0"/>
+              <a:t>we found </a:t>
+            </a:r>
+            <a:r>
+              <a:rPr lang="en-GB" sz="1600" dirty="0"/>
+              <a:t>that if the scientists wanted to be sure that a &gt;5% drop in observed cases of foot and mouth disease in the sheep at Yellowstone was significant they would have to observe at least 870 sheep</a:t>
+            </a:r>
+            <a:r>
+              <a:rPr lang="en-GB" sz="1600" dirty="0" smtClean="0"/>
+              <a:t>. </a:t>
+            </a:r>
+            <a:endParaRPr lang="en-GB" sz="1600" dirty="0"/>
+          </a:p>
+        </p:txBody>
+      </p:sp>
+      <p:sp>
+        <p:nvSpPr>
+          <p:cNvPr id="5" name="TextBox 4"/>
+          <p:cNvSpPr txBox="1"/>
+          <p:nvPr/>
+        </p:nvSpPr>
+        <p:spPr>
+          <a:xfrm>
+            <a:off x="971600" y="4005064"/>
+            <a:ext cx="7704856" cy="1107996"/>
+          </a:xfrm>
+          <a:prstGeom prst="rect">
+            <a:avLst/>
+          </a:prstGeom>
+          <a:noFill/>
+        </p:spPr>
+        <p:txBody>
+          <a:bodyPr wrap="square" rtlCol="0">
+            <a:spAutoFit/>
+          </a:bodyPr>
+          <a:lstStyle/>
+          <a:p>
+            <a:r>
+              <a:rPr lang="en-GB" sz="1600" dirty="0"/>
+              <a:t>This would take the scientists approximately 1 week to complete their observation. If the scientists wanted to repeat their measurements at Bryce National Park, it would take 3.48 </a:t>
+            </a:r>
+            <a:r>
+              <a:rPr lang="en-GB" sz="1600" dirty="0" smtClean="0"/>
+              <a:t>weeks.</a:t>
+            </a:r>
+            <a:endParaRPr lang="en-GB" sz="1600" dirty="0"/>
+          </a:p>
+          <a:p>
+            <a:endParaRPr lang="en-GB" sz="1600" dirty="0"/>
+          </a:p>
+        </p:txBody>
+      </p:sp>
       <p:pic>
         <p:nvPicPr>
-          <p:cNvPr id="2051" name="Picture 3"/>
+          <p:cNvPr id="7" name="Picture 3"/>
           <p:cNvPicPr>
             <a:picLocks noGrp="1" noChangeAspect="1" noChangeArrowheads="1"/>
           </p:cNvPicPr>
@@ -5352,8 +6082,8 @@
         </p:blipFill>
         <p:spPr bwMode="auto">
           <a:xfrm>
-            <a:off x="611560" y="2564904"/>
-            <a:ext cx="7521575" cy="2494229"/>
+            <a:off x="822325" y="1985938"/>
+            <a:ext cx="7521575" cy="1972064"/>
           </a:xfrm>
           <a:prstGeom prst="rect">
             <a:avLst/>
@@ -5383,52 +6113,6 @@
           </a:extLst>
         </p:spPr>
       </p:pic>
-      <p:sp>
-        <p:nvSpPr>
-          <p:cNvPr id="3" name="TextBox 2"/>
-          <p:cNvSpPr txBox="1"/>
-          <p:nvPr/>
-        </p:nvSpPr>
-        <p:spPr>
-          <a:xfrm>
-            <a:off x="1028133" y="908720"/>
-            <a:ext cx="6840760" cy="1815882"/>
-          </a:xfrm>
-          <a:prstGeom prst="rect">
-            <a:avLst/>
-          </a:prstGeom>
-          <a:noFill/>
-        </p:spPr>
-        <p:txBody>
-          <a:bodyPr wrap="square" rtlCol="0">
-            <a:spAutoFit/>
-          </a:bodyPr>
-          <a:lstStyle/>
-          <a:p>
-            <a:r>
-              <a:rPr lang="en-GB" sz="1600" dirty="0" smtClean="0"/>
-              <a:t>With a baseline 15</a:t>
-            </a:r>
-            <a:r>
-              <a:rPr lang="en-GB" sz="1600" dirty="0"/>
-              <a:t>% occurrence of foot and mouth disease in sheep at Bryce National Park, </a:t>
-            </a:r>
-            <a:r>
-              <a:rPr lang="en-GB" sz="1600" dirty="0" smtClean="0"/>
-              <a:t>we found </a:t>
-            </a:r>
-            <a:r>
-              <a:rPr lang="en-GB" sz="1600" dirty="0"/>
-              <a:t>that if the scientists wanted to be sure that a &gt;5% drop in observed cases of foot and mouth disease in the sheep at Yellowstone was significant they would have to observe at least 870 sheep</a:t>
-            </a:r>
-            <a:r>
-              <a:rPr lang="en-GB" sz="1600" dirty="0" smtClean="0"/>
-              <a:t>. This would take the scientists approximately 1 week to complete their observation. At Great Smoky this would take 5 weeks and at Yosemite it would take 3 weeks.	 </a:t>
-            </a:r>
-            <a:endParaRPr lang="en-GB" sz="1600" dirty="0"/>
-          </a:p>
-        </p:txBody>
-      </p:sp>
     </p:spTree>
     <p:extLst>
       <p:ext uri="{BB962C8B-B14F-4D97-AF65-F5344CB8AC3E}">

</xml_diff>